<commit_message>
Add presentation link to conclusion
</commit_message>
<xml_diff>
--- a/resources/presentation/chitter_prototype_presentation.pptx
+++ b/resources/presentation/chitter_prototype_presentation.pptx
@@ -14267,11 +14267,7 @@
             </a:r>
             <a:r>
               <a:rPr lang="en-IE" dirty="0" smtClean="0"/>
-              <a:t> </a:t>
-            </a:r>
-            <a:r>
-              <a:rPr lang="en-IE" dirty="0" smtClean="0"/>
-              <a:t>contain </a:t>
+              <a:t> contain </a:t>
             </a:r>
             <a:r>
               <a:rPr lang="en-IE" dirty="0"/>
@@ -14918,7 +14914,6 @@
               <a:rPr lang="en-IE" dirty="0"/>
               <a:t>app into MVC architecture on the server side.</a:t>
             </a:r>
-            <a:endParaRPr lang="en-IE" dirty="0"/>
           </a:p>
         </p:txBody>
       </p:sp>
@@ -15277,11 +15272,7 @@
           <a:p>
             <a:r>
               <a:rPr lang="en-IE" dirty="0" smtClean="0"/>
-              <a:t>Task </a:t>
-            </a:r>
-            <a:r>
-              <a:rPr lang="en-IE" dirty="0" smtClean="0"/>
-              <a:t>Manager </a:t>
+              <a:t>Task Manager </a:t>
             </a:r>
             <a:endParaRPr lang="en-IE" dirty="0"/>
           </a:p>
@@ -15357,7 +15348,6 @@
               <a:rPr lang="en-IE" dirty="0"/>
               <a:t>used for dependency management, so that you no longer have to manually download and manage your scripts.</a:t>
             </a:r>
-            <a:endParaRPr lang="en-IE" dirty="0"/>
           </a:p>
         </p:txBody>
       </p:sp>
@@ -15865,25 +15855,8 @@
             <a:pPr algn="just"/>
             <a:r>
               <a:rPr lang="en-IE" dirty="0" smtClean="0"/>
-              <a:t>Main </a:t>
-            </a:r>
-            <a:r>
-              <a:rPr lang="en-IE" dirty="0" smtClean="0"/>
-              <a:t>latest b</a:t>
-            </a:r>
-            <a:r>
-              <a:rPr lang="en-IE" dirty="0" smtClean="0"/>
-              <a:t>rowser </a:t>
-            </a:r>
-            <a:r>
-              <a:rPr lang="en-IE" dirty="0" smtClean="0"/>
-              <a:t>(Chrome, </a:t>
-            </a:r>
-            <a:r>
-              <a:rPr lang="en-IE" dirty="0" smtClean="0"/>
-              <a:t>Firefox, IE10+)</a:t>
-            </a:r>
-            <a:endParaRPr lang="en-IE" dirty="0" smtClean="0"/>
+              <a:t>Main latest browser (Chrome, Firefox, IE10+)</a:t>
+            </a:r>
           </a:p>
           <a:p>
             <a:pPr marL="68580" indent="0">
@@ -16127,11 +16100,7 @@
             </a:r>
             <a:r>
               <a:rPr lang="en-IE" dirty="0" smtClean="0"/>
-              <a:t>of </a:t>
-            </a:r>
-            <a:r>
-              <a:rPr lang="en-IE" dirty="0" smtClean="0"/>
-              <a:t>chitter app</a:t>
+              <a:t>of chitter app</a:t>
             </a:r>
             <a:endParaRPr lang="en-IE" dirty="0"/>
           </a:p>
@@ -16498,11 +16467,7 @@
             </a:r>
             <a:r>
               <a:rPr lang="en-IE" dirty="0" smtClean="0"/>
-              <a:t>development </a:t>
-            </a:r>
-            <a:r>
-              <a:rPr lang="en-IE" dirty="0" smtClean="0"/>
-              <a:t>principles</a:t>
+              <a:t>development principles</a:t>
             </a:r>
           </a:p>
           <a:p>
@@ -16511,15 +16476,37 @@
               <a:rPr lang="en-IE" dirty="0" smtClean="0"/>
               <a:t>We suggest all technologies as package because these technologies working very well together </a:t>
             </a:r>
-            <a:endParaRPr lang="en-IE" dirty="0" smtClean="0"/>
-          </a:p>
-          <a:p>
-            <a:pPr algn="just"/>
+          </a:p>
+          <a:p>
             <a:r>
               <a:rPr lang="en-IE" dirty="0" smtClean="0"/>
               <a:t>Presentation can be found here </a:t>
             </a:r>
-            <a:endParaRPr lang="en-IE" dirty="0"/>
+            <a:r>
+              <a:rPr lang="en-IE" sz="1900" i="1" dirty="0" smtClean="0"/>
+              <a:t>“</a:t>
+            </a:r>
+            <a:r>
+              <a:rPr lang="en-IE" sz="1900" i="1" dirty="0" smtClean="0"/>
+              <a:t>https</a:t>
+            </a:r>
+            <a:r>
+              <a:rPr lang="en-IE" sz="1900" i="1" dirty="0"/>
+              <a:t>://</a:t>
+            </a:r>
+            <a:r>
+              <a:rPr lang="en-IE" sz="1900" i="1" dirty="0" smtClean="0"/>
+              <a:t>github.com/</a:t>
+            </a:r>
+            <a:r>
+              <a:rPr lang="en-IE" sz="1900" i="1" dirty="0" err="1" smtClean="0"/>
+              <a:t>martinmicunda</a:t>
+            </a:r>
+            <a:r>
+              <a:rPr lang="en-IE" sz="1900" i="1" dirty="0" smtClean="0"/>
+              <a:t>/chitter-prototype/tree/master/resources/presentation”</a:t>
+            </a:r>
+            <a:endParaRPr lang="en-IE" sz="1900" i="1" dirty="0"/>
           </a:p>
         </p:txBody>
       </p:sp>

</xml_diff>